<commit_message>
Update 2022-04-10: Capstone Prototype with seasonality 2
</commit_message>
<xml_diff>
--- a/Capstone- Prototype/Prophet Forecast for Energy Data in Commercial Building.pptx
+++ b/Capstone- Prototype/Prophet Forecast for Energy Data in Commercial Building.pptx
@@ -18,6 +18,9 @@
     <p:sldId id="266" r:id="rId12"/>
     <p:sldId id="267" r:id="rId13"/>
     <p:sldId id="268" r:id="rId14"/>
+    <p:sldId id="269" r:id="rId15"/>
+    <p:sldId id="270" r:id="rId16"/>
+    <p:sldId id="271" r:id="rId17"/>
   </p:sldIdLst>
   <p:sldSz cx="12192000" cy="6858000"/>
   <p:notesSz cx="6858000" cy="9144000"/>
@@ -116,6 +119,11 @@
       </a:defRPr>
     </a:lvl9pPr>
   </p:defaultTextStyle>
+  <p:extLst>
+    <p:ext uri="{EFAFB233-063F-42B5-8137-9DF3F51BA10A}">
+      <p15:sldGuideLst xmlns:p15="http://schemas.microsoft.com/office/powerpoint/2012/main"/>
+    </p:ext>
+  </p:extLst>
 </p:presentation>
 </file>
 
@@ -19672,6 +19680,1663 @@
 </p:sld>
 </file>
 
+<file path=ppt/slides/slide14.xml><?xml version="1.0" encoding="utf-8"?>
+<p:sld xmlns:a="http://schemas.openxmlformats.org/drawingml/2006/main" xmlns:r="http://schemas.openxmlformats.org/officeDocument/2006/relationships" xmlns:p="http://schemas.openxmlformats.org/presentationml/2006/main">
+  <p:cSld>
+    <p:spTree>
+      <p:nvGrpSpPr>
+        <p:cNvPr id="1" name=""/>
+        <p:cNvGrpSpPr/>
+        <p:nvPr/>
+      </p:nvGrpSpPr>
+      <p:grpSpPr>
+        <a:xfrm>
+          <a:off x="0" y="0"/>
+          <a:ext cx="0" cy="0"/>
+          <a:chOff x="0" y="0"/>
+          <a:chExt cx="0" cy="0"/>
+        </a:xfrm>
+      </p:grpSpPr>
+      <p:sp>
+        <p:nvSpPr>
+          <p:cNvPr id="2" name="Title 1">
+            <a:extLst>
+              <a:ext uri="{FF2B5EF4-FFF2-40B4-BE49-F238E27FC236}">
+                <a16:creationId xmlns:a16="http://schemas.microsoft.com/office/drawing/2014/main" id="{2C1B45A4-CFA6-45CE-B957-4FD846498E19}"/>
+              </a:ext>
+            </a:extLst>
+          </p:cNvPr>
+          <p:cNvSpPr>
+            <a:spLocks noGrp="1"/>
+          </p:cNvSpPr>
+          <p:nvPr>
+            <p:ph type="title"/>
+          </p:nvPr>
+        </p:nvSpPr>
+        <p:spPr>
+          <a:xfrm>
+            <a:off x="565150" y="770890"/>
+            <a:ext cx="11184890" cy="1268984"/>
+          </a:xfrm>
+        </p:spPr>
+        <p:txBody>
+          <a:bodyPr>
+            <a:normAutofit fontScale="90000"/>
+          </a:bodyPr>
+          <a:lstStyle/>
+          <a:p>
+            <a:r>
+              <a:rPr lang="en-US" dirty="0"/>
+              <a:t>Forecasting results with and without using center (training data of 180 days to predict 30 days)</a:t>
+            </a:r>
+          </a:p>
+        </p:txBody>
+      </p:sp>
+      <p:sp>
+        <p:nvSpPr>
+          <p:cNvPr id="4" name="TextBox 3">
+            <a:extLst>
+              <a:ext uri="{FF2B5EF4-FFF2-40B4-BE49-F238E27FC236}">
+                <a16:creationId xmlns:a16="http://schemas.microsoft.com/office/drawing/2014/main" id="{1A5B71ED-83FC-4290-AF99-4BAD9227C3FA}"/>
+              </a:ext>
+            </a:extLst>
+          </p:cNvPr>
+          <p:cNvSpPr txBox="1"/>
+          <p:nvPr/>
+        </p:nvSpPr>
+        <p:spPr>
+          <a:xfrm>
+            <a:off x="6318504" y="2185416"/>
+            <a:ext cx="3749040" cy="3416320"/>
+          </a:xfrm>
+          <a:prstGeom prst="rect">
+            <a:avLst/>
+          </a:prstGeom>
+          <a:noFill/>
+        </p:spPr>
+        <p:txBody>
+          <a:bodyPr wrap="square" rtlCol="0">
+            <a:spAutoFit/>
+          </a:bodyPr>
+          <a:lstStyle/>
+          <a:p>
+            <a:r>
+              <a:rPr lang="en-US" dirty="0"/>
+              <a:t>This is done with the training data to be 6 months of data.</a:t>
+            </a:r>
+          </a:p>
+          <a:p>
+            <a:r>
+              <a:rPr lang="en-US" dirty="0"/>
+              <a:t>In this case, the MAPE results are still better when using center data. However, more cases without using cluster center data seems to become more and more effective. This is probably due to the fact that deviation applied to each curve is simply using the average daily deviation of last week of training data.  </a:t>
+            </a:r>
+          </a:p>
+        </p:txBody>
+      </p:sp>
+      <p:graphicFrame>
+        <p:nvGraphicFramePr>
+          <p:cNvPr id="3" name="Table 2">
+            <a:extLst>
+              <a:ext uri="{FF2B5EF4-FFF2-40B4-BE49-F238E27FC236}">
+                <a16:creationId xmlns:a16="http://schemas.microsoft.com/office/drawing/2014/main" id="{52A220E9-7BB3-4793-AAF7-4C2A63E0F613}"/>
+              </a:ext>
+            </a:extLst>
+          </p:cNvPr>
+          <p:cNvGraphicFramePr>
+            <a:graphicFrameLocks noGrp="1"/>
+          </p:cNvGraphicFramePr>
+          <p:nvPr>
+            <p:extLst>
+              <p:ext uri="{D42A27DB-BD31-4B8C-83A1-F6EECF244321}">
+                <p14:modId xmlns:p14="http://schemas.microsoft.com/office/powerpoint/2010/main" val="2316371767"/>
+              </p:ext>
+            </p:extLst>
+          </p:nvPr>
+        </p:nvGraphicFramePr>
+        <p:xfrm>
+          <a:off x="712417" y="2265488"/>
+          <a:ext cx="4407289" cy="3238500"/>
+        </p:xfrm>
+        <a:graphic>
+          <a:graphicData uri="http://schemas.openxmlformats.org/drawingml/2006/table">
+            <a:tbl>
+              <a:tblPr>
+                <a:tableStyleId>{5C22544A-7EE6-4342-B048-85BDC9FD1C3A}</a:tableStyleId>
+              </a:tblPr>
+              <a:tblGrid>
+                <a:gridCol w="730742">
+                  <a:extLst>
+                    <a:ext uri="{9D8B030D-6E8A-4147-A177-3AD203B41FA5}">
+                      <a16:colId xmlns:a16="http://schemas.microsoft.com/office/drawing/2014/main" val="1801013745"/>
+                    </a:ext>
+                  </a:extLst>
+                </a:gridCol>
+                <a:gridCol w="2118336">
+                  <a:extLst>
+                    <a:ext uri="{9D8B030D-6E8A-4147-A177-3AD203B41FA5}">
+                      <a16:colId xmlns:a16="http://schemas.microsoft.com/office/drawing/2014/main" val="1388703396"/>
+                    </a:ext>
+                  </a:extLst>
+                </a:gridCol>
+                <a:gridCol w="1558211">
+                  <a:extLst>
+                    <a:ext uri="{9D8B030D-6E8A-4147-A177-3AD203B41FA5}">
+                      <a16:colId xmlns:a16="http://schemas.microsoft.com/office/drawing/2014/main" val="2222769248"/>
+                    </a:ext>
+                  </a:extLst>
+                </a:gridCol>
+              </a:tblGrid>
+              <a:tr h="190500">
+                <a:tc>
+                  <a:txBody>
+                    <a:bodyPr/>
+                    <a:lstStyle/>
+                    <a:p>
+                      <a:pPr algn="l" fontAlgn="b"/>
+                      <a:r>
+                        <a:rPr lang="en-US" sz="1100" u="none" strike="noStrike">
+                          <a:effectLst/>
+                        </a:rPr>
+                        <a:t>Number</a:t>
+                      </a:r>
+                      <a:endParaRPr lang="en-US" sz="1100" b="0" i="0" u="none" strike="noStrike">
+                        <a:solidFill>
+                          <a:srgbClr val="000000"/>
+                        </a:solidFill>
+                        <a:effectLst/>
+                        <a:latin typeface="Calibri" panose="020F0502020204030204" pitchFamily="34" charset="0"/>
+                      </a:endParaRPr>
+                    </a:p>
+                  </a:txBody>
+                  <a:tcPr marL="9525" marR="9525" marT="9525" marB="0" anchor="b"/>
+                </a:tc>
+                <a:tc>
+                  <a:txBody>
+                    <a:bodyPr/>
+                    <a:lstStyle/>
+                    <a:p>
+                      <a:pPr algn="l" fontAlgn="b"/>
+                      <a:r>
+                        <a:rPr lang="en-US" sz="1100" u="none" strike="noStrike">
+                          <a:effectLst/>
+                        </a:rPr>
+                        <a:t>MAPE without using center</a:t>
+                      </a:r>
+                      <a:endParaRPr lang="en-US" sz="1100" b="0" i="0" u="none" strike="noStrike">
+                        <a:solidFill>
+                          <a:srgbClr val="000000"/>
+                        </a:solidFill>
+                        <a:effectLst/>
+                        <a:latin typeface="Calibri" panose="020F0502020204030204" pitchFamily="34" charset="0"/>
+                      </a:endParaRPr>
+                    </a:p>
+                  </a:txBody>
+                  <a:tcPr marL="9525" marR="9525" marT="9525" marB="0" anchor="b"/>
+                </a:tc>
+                <a:tc>
+                  <a:txBody>
+                    <a:bodyPr/>
+                    <a:lstStyle/>
+                    <a:p>
+                      <a:pPr algn="l" fontAlgn="b"/>
+                      <a:r>
+                        <a:rPr lang="en-US" sz="1100" u="none" strike="noStrike" dirty="0">
+                          <a:effectLst/>
+                        </a:rPr>
+                        <a:t>MAPE using center</a:t>
+                      </a:r>
+                      <a:endParaRPr lang="en-US" sz="1100" b="0" i="0" u="none" strike="noStrike" dirty="0">
+                        <a:solidFill>
+                          <a:srgbClr val="000000"/>
+                        </a:solidFill>
+                        <a:effectLst/>
+                        <a:latin typeface="Calibri" panose="020F0502020204030204" pitchFamily="34" charset="0"/>
+                      </a:endParaRPr>
+                    </a:p>
+                  </a:txBody>
+                  <a:tcPr marL="9525" marR="9525" marT="9525" marB="0" anchor="b"/>
+                </a:tc>
+                <a:extLst>
+                  <a:ext uri="{0D108BD9-81ED-4DB2-BD59-A6C34878D82A}">
+                    <a16:rowId xmlns:a16="http://schemas.microsoft.com/office/drawing/2014/main" val="2326037884"/>
+                  </a:ext>
+                </a:extLst>
+              </a:tr>
+              <a:tr h="190500">
+                <a:tc>
+                  <a:txBody>
+                    <a:bodyPr/>
+                    <a:lstStyle/>
+                    <a:p>
+                      <a:pPr algn="r" fontAlgn="ctr"/>
+                      <a:r>
+                        <a:rPr lang="en-US" sz="1100" u="none" strike="noStrike">
+                          <a:effectLst/>
+                        </a:rPr>
+                        <a:t>1</a:t>
+                      </a:r>
+                      <a:endParaRPr lang="en-US" sz="1100" b="0" i="0" u="none" strike="noStrike">
+                        <a:solidFill>
+                          <a:srgbClr val="1A202C"/>
+                        </a:solidFill>
+                        <a:effectLst/>
+                        <a:latin typeface="Var(--jp-code-font-family)"/>
+                      </a:endParaRPr>
+                    </a:p>
+                  </a:txBody>
+                  <a:tcPr marL="9525" marR="9525" marT="9525" marB="0" anchor="ctr"/>
+                </a:tc>
+                <a:tc>
+                  <a:txBody>
+                    <a:bodyPr/>
+                    <a:lstStyle/>
+                    <a:p>
+                      <a:pPr algn="r" fontAlgn="b"/>
+                      <a:r>
+                        <a:rPr lang="en-US" sz="1100" u="none" strike="noStrike">
+                          <a:effectLst/>
+                        </a:rPr>
+                        <a:t>0.376440872</a:t>
+                      </a:r>
+                      <a:endParaRPr lang="en-US" sz="1100" b="0" i="0" u="none" strike="noStrike">
+                        <a:solidFill>
+                          <a:srgbClr val="000000"/>
+                        </a:solidFill>
+                        <a:effectLst/>
+                        <a:latin typeface="Calibri" panose="020F0502020204030204" pitchFamily="34" charset="0"/>
+                      </a:endParaRPr>
+                    </a:p>
+                  </a:txBody>
+                  <a:tcPr marL="9525" marR="9525" marT="9525" marB="0" anchor="b"/>
+                </a:tc>
+                <a:tc>
+                  <a:txBody>
+                    <a:bodyPr/>
+                    <a:lstStyle/>
+                    <a:p>
+                      <a:pPr algn="r" fontAlgn="b"/>
+                      <a:r>
+                        <a:rPr lang="en-US" sz="1100" u="none" strike="noStrike" dirty="0">
+                          <a:solidFill>
+                            <a:srgbClr val="00B050"/>
+                          </a:solidFill>
+                          <a:effectLst/>
+                        </a:rPr>
+                        <a:t>0.145852673</a:t>
+                      </a:r>
+                      <a:endParaRPr lang="en-US" sz="1100" b="0" i="0" u="none" strike="noStrike" dirty="0">
+                        <a:solidFill>
+                          <a:srgbClr val="00B050"/>
+                        </a:solidFill>
+                        <a:effectLst/>
+                        <a:latin typeface="Calibri" panose="020F0502020204030204" pitchFamily="34" charset="0"/>
+                      </a:endParaRPr>
+                    </a:p>
+                  </a:txBody>
+                  <a:tcPr marL="9525" marR="9525" marT="9525" marB="0" anchor="b"/>
+                </a:tc>
+                <a:extLst>
+                  <a:ext uri="{0D108BD9-81ED-4DB2-BD59-A6C34878D82A}">
+                    <a16:rowId xmlns:a16="http://schemas.microsoft.com/office/drawing/2014/main" val="1054443702"/>
+                  </a:ext>
+                </a:extLst>
+              </a:tr>
+              <a:tr h="190500">
+                <a:tc>
+                  <a:txBody>
+                    <a:bodyPr/>
+                    <a:lstStyle/>
+                    <a:p>
+                      <a:pPr algn="r" fontAlgn="ctr"/>
+                      <a:r>
+                        <a:rPr lang="en-US" sz="1100" u="none" strike="noStrike">
+                          <a:effectLst/>
+                        </a:rPr>
+                        <a:t>2</a:t>
+                      </a:r>
+                      <a:endParaRPr lang="en-US" sz="1100" b="0" i="0" u="none" strike="noStrike">
+                        <a:solidFill>
+                          <a:srgbClr val="1A202C"/>
+                        </a:solidFill>
+                        <a:effectLst/>
+                        <a:latin typeface="Var(--jp-code-font-family)"/>
+                      </a:endParaRPr>
+                    </a:p>
+                  </a:txBody>
+                  <a:tcPr marL="9525" marR="9525" marT="9525" marB="0" anchor="ctr"/>
+                </a:tc>
+                <a:tc>
+                  <a:txBody>
+                    <a:bodyPr/>
+                    <a:lstStyle/>
+                    <a:p>
+                      <a:pPr algn="r" fontAlgn="b"/>
+                      <a:r>
+                        <a:rPr lang="en-US" sz="1100" u="none" strike="noStrike">
+                          <a:effectLst/>
+                        </a:rPr>
+                        <a:t>0.320178515</a:t>
+                      </a:r>
+                      <a:endParaRPr lang="en-US" sz="1100" b="0" i="0" u="none" strike="noStrike">
+                        <a:solidFill>
+                          <a:srgbClr val="000000"/>
+                        </a:solidFill>
+                        <a:effectLst/>
+                        <a:latin typeface="Calibri" panose="020F0502020204030204" pitchFamily="34" charset="0"/>
+                      </a:endParaRPr>
+                    </a:p>
+                  </a:txBody>
+                  <a:tcPr marL="9525" marR="9525" marT="9525" marB="0" anchor="b"/>
+                </a:tc>
+                <a:tc>
+                  <a:txBody>
+                    <a:bodyPr/>
+                    <a:lstStyle/>
+                    <a:p>
+                      <a:pPr algn="r" fontAlgn="b"/>
+                      <a:r>
+                        <a:rPr lang="en-US" sz="1100" u="none" strike="noStrike" kern="1200" dirty="0">
+                          <a:solidFill>
+                            <a:srgbClr val="00B050"/>
+                          </a:solidFill>
+                          <a:effectLst/>
+                          <a:latin typeface="+mn-lt"/>
+                          <a:ea typeface="+mn-ea"/>
+                          <a:cs typeface="+mn-cs"/>
+                        </a:rPr>
+                        <a:t>0.313095505</a:t>
+                      </a:r>
+                    </a:p>
+                  </a:txBody>
+                  <a:tcPr marL="9525" marR="9525" marT="9525" marB="0" anchor="b"/>
+                </a:tc>
+                <a:extLst>
+                  <a:ext uri="{0D108BD9-81ED-4DB2-BD59-A6C34878D82A}">
+                    <a16:rowId xmlns:a16="http://schemas.microsoft.com/office/drawing/2014/main" val="1520539136"/>
+                  </a:ext>
+                </a:extLst>
+              </a:tr>
+              <a:tr h="190500">
+                <a:tc>
+                  <a:txBody>
+                    <a:bodyPr/>
+                    <a:lstStyle/>
+                    <a:p>
+                      <a:pPr algn="r" fontAlgn="ctr"/>
+                      <a:r>
+                        <a:rPr lang="en-US" sz="1100" u="none" strike="noStrike">
+                          <a:effectLst/>
+                        </a:rPr>
+                        <a:t>3</a:t>
+                      </a:r>
+                      <a:endParaRPr lang="en-US" sz="1100" b="0" i="0" u="none" strike="noStrike">
+                        <a:solidFill>
+                          <a:srgbClr val="1A202C"/>
+                        </a:solidFill>
+                        <a:effectLst/>
+                        <a:latin typeface="Var(--jp-code-font-family)"/>
+                      </a:endParaRPr>
+                    </a:p>
+                  </a:txBody>
+                  <a:tcPr marL="9525" marR="9525" marT="9525" marB="0" anchor="ctr"/>
+                </a:tc>
+                <a:tc>
+                  <a:txBody>
+                    <a:bodyPr/>
+                    <a:lstStyle/>
+                    <a:p>
+                      <a:pPr algn="r" fontAlgn="b"/>
+                      <a:r>
+                        <a:rPr lang="en-US" sz="1100" u="none" strike="noStrike">
+                          <a:effectLst/>
+                        </a:rPr>
+                        <a:t>0.093581957</a:t>
+                      </a:r>
+                      <a:endParaRPr lang="en-US" sz="1100" b="0" i="0" u="none" strike="noStrike">
+                        <a:solidFill>
+                          <a:srgbClr val="000000"/>
+                        </a:solidFill>
+                        <a:effectLst/>
+                        <a:latin typeface="Calibri" panose="020F0502020204030204" pitchFamily="34" charset="0"/>
+                      </a:endParaRPr>
+                    </a:p>
+                  </a:txBody>
+                  <a:tcPr marL="9525" marR="9525" marT="9525" marB="0" anchor="b"/>
+                </a:tc>
+                <a:tc>
+                  <a:txBody>
+                    <a:bodyPr/>
+                    <a:lstStyle/>
+                    <a:p>
+                      <a:pPr algn="r" fontAlgn="b"/>
+                      <a:r>
+                        <a:rPr lang="en-US" sz="1100" u="none" strike="noStrike" kern="1200" dirty="0">
+                          <a:solidFill>
+                            <a:srgbClr val="00B050"/>
+                          </a:solidFill>
+                          <a:effectLst/>
+                          <a:latin typeface="+mn-lt"/>
+                          <a:ea typeface="+mn-ea"/>
+                          <a:cs typeface="+mn-cs"/>
+                        </a:rPr>
+                        <a:t>0.076304125</a:t>
+                      </a:r>
+                    </a:p>
+                  </a:txBody>
+                  <a:tcPr marL="9525" marR="9525" marT="9525" marB="0" anchor="b"/>
+                </a:tc>
+                <a:extLst>
+                  <a:ext uri="{0D108BD9-81ED-4DB2-BD59-A6C34878D82A}">
+                    <a16:rowId xmlns:a16="http://schemas.microsoft.com/office/drawing/2014/main" val="61074364"/>
+                  </a:ext>
+                </a:extLst>
+              </a:tr>
+              <a:tr h="190500">
+                <a:tc>
+                  <a:txBody>
+                    <a:bodyPr/>
+                    <a:lstStyle/>
+                    <a:p>
+                      <a:pPr algn="r" fontAlgn="ctr"/>
+                      <a:r>
+                        <a:rPr lang="en-US" sz="1100" u="none" strike="noStrike">
+                          <a:effectLst/>
+                        </a:rPr>
+                        <a:t>4</a:t>
+                      </a:r>
+                      <a:endParaRPr lang="en-US" sz="1100" b="0" i="0" u="none" strike="noStrike">
+                        <a:solidFill>
+                          <a:srgbClr val="1A202C"/>
+                        </a:solidFill>
+                        <a:effectLst/>
+                        <a:latin typeface="Var(--jp-code-font-family)"/>
+                      </a:endParaRPr>
+                    </a:p>
+                  </a:txBody>
+                  <a:tcPr marL="9525" marR="9525" marT="9525" marB="0" anchor="ctr"/>
+                </a:tc>
+                <a:tc>
+                  <a:txBody>
+                    <a:bodyPr/>
+                    <a:lstStyle/>
+                    <a:p>
+                      <a:pPr algn="r" fontAlgn="b"/>
+                      <a:r>
+                        <a:rPr lang="en-US" sz="1100" u="none" strike="noStrike">
+                          <a:effectLst/>
+                        </a:rPr>
+                        <a:t>0.158212225</a:t>
+                      </a:r>
+                      <a:endParaRPr lang="en-US" sz="1100" b="0" i="0" u="none" strike="noStrike">
+                        <a:solidFill>
+                          <a:srgbClr val="000000"/>
+                        </a:solidFill>
+                        <a:effectLst/>
+                        <a:latin typeface="Calibri" panose="020F0502020204030204" pitchFamily="34" charset="0"/>
+                      </a:endParaRPr>
+                    </a:p>
+                  </a:txBody>
+                  <a:tcPr marL="9525" marR="9525" marT="9525" marB="0" anchor="b"/>
+                </a:tc>
+                <a:tc>
+                  <a:txBody>
+                    <a:bodyPr/>
+                    <a:lstStyle/>
+                    <a:p>
+                      <a:pPr algn="r" fontAlgn="b"/>
+                      <a:r>
+                        <a:rPr lang="en-US" sz="1100" u="none" strike="noStrike" kern="1200" dirty="0">
+                          <a:solidFill>
+                            <a:srgbClr val="00B050"/>
+                          </a:solidFill>
+                          <a:effectLst/>
+                          <a:latin typeface="+mn-lt"/>
+                          <a:ea typeface="+mn-ea"/>
+                          <a:cs typeface="+mn-cs"/>
+                        </a:rPr>
+                        <a:t>0.157776203</a:t>
+                      </a:r>
+                    </a:p>
+                  </a:txBody>
+                  <a:tcPr marL="9525" marR="9525" marT="9525" marB="0" anchor="b"/>
+                </a:tc>
+                <a:extLst>
+                  <a:ext uri="{0D108BD9-81ED-4DB2-BD59-A6C34878D82A}">
+                    <a16:rowId xmlns:a16="http://schemas.microsoft.com/office/drawing/2014/main" val="4215356128"/>
+                  </a:ext>
+                </a:extLst>
+              </a:tr>
+              <a:tr h="190500">
+                <a:tc>
+                  <a:txBody>
+                    <a:bodyPr/>
+                    <a:lstStyle/>
+                    <a:p>
+                      <a:pPr algn="r" fontAlgn="ctr"/>
+                      <a:r>
+                        <a:rPr lang="en-US" sz="1100" u="none" strike="noStrike">
+                          <a:effectLst/>
+                        </a:rPr>
+                        <a:t>5</a:t>
+                      </a:r>
+                      <a:endParaRPr lang="en-US" sz="1100" b="0" i="0" u="none" strike="noStrike">
+                        <a:solidFill>
+                          <a:srgbClr val="1A202C"/>
+                        </a:solidFill>
+                        <a:effectLst/>
+                        <a:latin typeface="Var(--jp-code-font-family)"/>
+                      </a:endParaRPr>
+                    </a:p>
+                  </a:txBody>
+                  <a:tcPr marL="9525" marR="9525" marT="9525" marB="0" anchor="ctr"/>
+                </a:tc>
+                <a:tc>
+                  <a:txBody>
+                    <a:bodyPr/>
+                    <a:lstStyle/>
+                    <a:p>
+                      <a:pPr algn="r" fontAlgn="b"/>
+                      <a:r>
+                        <a:rPr lang="en-US" sz="1100" u="none" strike="noStrike">
+                          <a:effectLst/>
+                        </a:rPr>
+                        <a:t>0.115036777</a:t>
+                      </a:r>
+                      <a:endParaRPr lang="en-US" sz="1100" b="0" i="0" u="none" strike="noStrike">
+                        <a:solidFill>
+                          <a:srgbClr val="000000"/>
+                        </a:solidFill>
+                        <a:effectLst/>
+                        <a:latin typeface="Calibri" panose="020F0502020204030204" pitchFamily="34" charset="0"/>
+                      </a:endParaRPr>
+                    </a:p>
+                  </a:txBody>
+                  <a:tcPr marL="9525" marR="9525" marT="9525" marB="0" anchor="b"/>
+                </a:tc>
+                <a:tc>
+                  <a:txBody>
+                    <a:bodyPr/>
+                    <a:lstStyle/>
+                    <a:p>
+                      <a:pPr algn="r" fontAlgn="b"/>
+                      <a:r>
+                        <a:rPr lang="en-US" sz="1100" u="none" strike="noStrike" kern="1200" dirty="0">
+                          <a:solidFill>
+                            <a:srgbClr val="00B050"/>
+                          </a:solidFill>
+                          <a:effectLst/>
+                          <a:latin typeface="+mn-lt"/>
+                          <a:ea typeface="+mn-ea"/>
+                          <a:cs typeface="+mn-cs"/>
+                        </a:rPr>
+                        <a:t>0.10154829</a:t>
+                      </a:r>
+                    </a:p>
+                  </a:txBody>
+                  <a:tcPr marL="9525" marR="9525" marT="9525" marB="0" anchor="b"/>
+                </a:tc>
+                <a:extLst>
+                  <a:ext uri="{0D108BD9-81ED-4DB2-BD59-A6C34878D82A}">
+                    <a16:rowId xmlns:a16="http://schemas.microsoft.com/office/drawing/2014/main" val="3288055195"/>
+                  </a:ext>
+                </a:extLst>
+              </a:tr>
+              <a:tr h="190500">
+                <a:tc>
+                  <a:txBody>
+                    <a:bodyPr/>
+                    <a:lstStyle/>
+                    <a:p>
+                      <a:pPr algn="r" fontAlgn="ctr"/>
+                      <a:r>
+                        <a:rPr lang="en-US" sz="1100" u="none" strike="noStrike">
+                          <a:effectLst/>
+                        </a:rPr>
+                        <a:t>6</a:t>
+                      </a:r>
+                      <a:endParaRPr lang="en-US" sz="1100" b="0" i="0" u="none" strike="noStrike">
+                        <a:solidFill>
+                          <a:srgbClr val="1A202C"/>
+                        </a:solidFill>
+                        <a:effectLst/>
+                        <a:latin typeface="Var(--jp-code-font-family)"/>
+                      </a:endParaRPr>
+                    </a:p>
+                  </a:txBody>
+                  <a:tcPr marL="9525" marR="9525" marT="9525" marB="0" anchor="ctr"/>
+                </a:tc>
+                <a:tc>
+                  <a:txBody>
+                    <a:bodyPr/>
+                    <a:lstStyle/>
+                    <a:p>
+                      <a:pPr algn="r" fontAlgn="b"/>
+                      <a:r>
+                        <a:rPr lang="en-US" sz="1100" u="none" strike="noStrike">
+                          <a:effectLst/>
+                        </a:rPr>
+                        <a:t>0.180466025</a:t>
+                      </a:r>
+                      <a:endParaRPr lang="en-US" sz="1100" b="0" i="0" u="none" strike="noStrike">
+                        <a:solidFill>
+                          <a:srgbClr val="000000"/>
+                        </a:solidFill>
+                        <a:effectLst/>
+                        <a:latin typeface="Calibri" panose="020F0502020204030204" pitchFamily="34" charset="0"/>
+                      </a:endParaRPr>
+                    </a:p>
+                  </a:txBody>
+                  <a:tcPr marL="9525" marR="9525" marT="9525" marB="0" anchor="b"/>
+                </a:tc>
+                <a:tc>
+                  <a:txBody>
+                    <a:bodyPr/>
+                    <a:lstStyle/>
+                    <a:p>
+                      <a:pPr algn="r" fontAlgn="b"/>
+                      <a:r>
+                        <a:rPr lang="en-US" sz="1100" u="none" strike="noStrike" kern="1200" dirty="0">
+                          <a:solidFill>
+                            <a:srgbClr val="00B050"/>
+                          </a:solidFill>
+                          <a:effectLst/>
+                          <a:latin typeface="+mn-lt"/>
+                          <a:ea typeface="+mn-ea"/>
+                          <a:cs typeface="+mn-cs"/>
+                        </a:rPr>
+                        <a:t>0.152801094</a:t>
+                      </a:r>
+                    </a:p>
+                  </a:txBody>
+                  <a:tcPr marL="9525" marR="9525" marT="9525" marB="0" anchor="b"/>
+                </a:tc>
+                <a:extLst>
+                  <a:ext uri="{0D108BD9-81ED-4DB2-BD59-A6C34878D82A}">
+                    <a16:rowId xmlns:a16="http://schemas.microsoft.com/office/drawing/2014/main" val="1798771068"/>
+                  </a:ext>
+                </a:extLst>
+              </a:tr>
+              <a:tr h="190500">
+                <a:tc>
+                  <a:txBody>
+                    <a:bodyPr/>
+                    <a:lstStyle/>
+                    <a:p>
+                      <a:pPr algn="r" fontAlgn="ctr"/>
+                      <a:r>
+                        <a:rPr lang="en-US" sz="1100" u="none" strike="noStrike">
+                          <a:effectLst/>
+                        </a:rPr>
+                        <a:t>7</a:t>
+                      </a:r>
+                      <a:endParaRPr lang="en-US" sz="1100" b="0" i="0" u="none" strike="noStrike">
+                        <a:solidFill>
+                          <a:srgbClr val="1A202C"/>
+                        </a:solidFill>
+                        <a:effectLst/>
+                        <a:latin typeface="Var(--jp-code-font-family)"/>
+                      </a:endParaRPr>
+                    </a:p>
+                  </a:txBody>
+                  <a:tcPr marL="9525" marR="9525" marT="9525" marB="0" anchor="ctr"/>
+                </a:tc>
+                <a:tc>
+                  <a:txBody>
+                    <a:bodyPr/>
+                    <a:lstStyle/>
+                    <a:p>
+                      <a:pPr algn="r" fontAlgn="b"/>
+                      <a:r>
+                        <a:rPr lang="en-US" sz="1100" u="none" strike="noStrike" kern="1200" dirty="0">
+                          <a:solidFill>
+                            <a:srgbClr val="00B050"/>
+                          </a:solidFill>
+                          <a:effectLst/>
+                          <a:latin typeface="+mn-lt"/>
+                          <a:ea typeface="+mn-ea"/>
+                          <a:cs typeface="+mn-cs"/>
+                        </a:rPr>
+                        <a:t>1.059436235</a:t>
+                      </a:r>
+                    </a:p>
+                  </a:txBody>
+                  <a:tcPr marL="9525" marR="9525" marT="9525" marB="0" anchor="b"/>
+                </a:tc>
+                <a:tc>
+                  <a:txBody>
+                    <a:bodyPr/>
+                    <a:lstStyle/>
+                    <a:p>
+                      <a:pPr algn="r" fontAlgn="b"/>
+                      <a:r>
+                        <a:rPr lang="en-US" sz="1100" u="none" strike="noStrike">
+                          <a:effectLst/>
+                        </a:rPr>
+                        <a:t>1.364778828</a:t>
+                      </a:r>
+                      <a:endParaRPr lang="en-US" sz="1100" b="0" i="0" u="none" strike="noStrike">
+                        <a:solidFill>
+                          <a:srgbClr val="000000"/>
+                        </a:solidFill>
+                        <a:effectLst/>
+                        <a:latin typeface="Calibri" panose="020F0502020204030204" pitchFamily="34" charset="0"/>
+                      </a:endParaRPr>
+                    </a:p>
+                  </a:txBody>
+                  <a:tcPr marL="9525" marR="9525" marT="9525" marB="0" anchor="b"/>
+                </a:tc>
+                <a:extLst>
+                  <a:ext uri="{0D108BD9-81ED-4DB2-BD59-A6C34878D82A}">
+                    <a16:rowId xmlns:a16="http://schemas.microsoft.com/office/drawing/2014/main" val="3465505583"/>
+                  </a:ext>
+                </a:extLst>
+              </a:tr>
+              <a:tr h="190500">
+                <a:tc>
+                  <a:txBody>
+                    <a:bodyPr/>
+                    <a:lstStyle/>
+                    <a:p>
+                      <a:pPr algn="r" fontAlgn="ctr"/>
+                      <a:r>
+                        <a:rPr lang="en-US" sz="1100" u="none" strike="noStrike">
+                          <a:effectLst/>
+                        </a:rPr>
+                        <a:t>8</a:t>
+                      </a:r>
+                      <a:endParaRPr lang="en-US" sz="1100" b="0" i="0" u="none" strike="noStrike">
+                        <a:solidFill>
+                          <a:srgbClr val="1A202C"/>
+                        </a:solidFill>
+                        <a:effectLst/>
+                        <a:latin typeface="Var(--jp-code-font-family)"/>
+                      </a:endParaRPr>
+                    </a:p>
+                  </a:txBody>
+                  <a:tcPr marL="9525" marR="9525" marT="9525" marB="0" anchor="ctr"/>
+                </a:tc>
+                <a:tc>
+                  <a:txBody>
+                    <a:bodyPr/>
+                    <a:lstStyle/>
+                    <a:p>
+                      <a:pPr algn="r" fontAlgn="b"/>
+                      <a:r>
+                        <a:rPr lang="en-US" sz="1100" u="none" strike="noStrike" kern="1200" dirty="0">
+                          <a:solidFill>
+                            <a:srgbClr val="00B050"/>
+                          </a:solidFill>
+                          <a:effectLst/>
+                          <a:latin typeface="+mn-lt"/>
+                          <a:ea typeface="+mn-ea"/>
+                          <a:cs typeface="+mn-cs"/>
+                        </a:rPr>
+                        <a:t>0.435952378</a:t>
+                      </a:r>
+                    </a:p>
+                  </a:txBody>
+                  <a:tcPr marL="9525" marR="9525" marT="9525" marB="0" anchor="b"/>
+                </a:tc>
+                <a:tc>
+                  <a:txBody>
+                    <a:bodyPr/>
+                    <a:lstStyle/>
+                    <a:p>
+                      <a:pPr algn="r" fontAlgn="b"/>
+                      <a:r>
+                        <a:rPr lang="en-US" sz="1100" u="none" strike="noStrike">
+                          <a:effectLst/>
+                        </a:rPr>
+                        <a:t>0.560262096</a:t>
+                      </a:r>
+                      <a:endParaRPr lang="en-US" sz="1100" b="0" i="0" u="none" strike="noStrike">
+                        <a:solidFill>
+                          <a:srgbClr val="000000"/>
+                        </a:solidFill>
+                        <a:effectLst/>
+                        <a:latin typeface="Calibri" panose="020F0502020204030204" pitchFamily="34" charset="0"/>
+                      </a:endParaRPr>
+                    </a:p>
+                  </a:txBody>
+                  <a:tcPr marL="9525" marR="9525" marT="9525" marB="0" anchor="b"/>
+                </a:tc>
+                <a:extLst>
+                  <a:ext uri="{0D108BD9-81ED-4DB2-BD59-A6C34878D82A}">
+                    <a16:rowId xmlns:a16="http://schemas.microsoft.com/office/drawing/2014/main" val="927375102"/>
+                  </a:ext>
+                </a:extLst>
+              </a:tr>
+              <a:tr h="190500">
+                <a:tc>
+                  <a:txBody>
+                    <a:bodyPr/>
+                    <a:lstStyle/>
+                    <a:p>
+                      <a:pPr algn="r" fontAlgn="ctr"/>
+                      <a:r>
+                        <a:rPr lang="en-US" sz="1100" u="none" strike="noStrike">
+                          <a:effectLst/>
+                        </a:rPr>
+                        <a:t>9</a:t>
+                      </a:r>
+                      <a:endParaRPr lang="en-US" sz="1100" b="0" i="0" u="none" strike="noStrike">
+                        <a:solidFill>
+                          <a:srgbClr val="1A202C"/>
+                        </a:solidFill>
+                        <a:effectLst/>
+                        <a:latin typeface="Var(--jp-code-font-family)"/>
+                      </a:endParaRPr>
+                    </a:p>
+                  </a:txBody>
+                  <a:tcPr marL="9525" marR="9525" marT="9525" marB="0" anchor="ctr"/>
+                </a:tc>
+                <a:tc>
+                  <a:txBody>
+                    <a:bodyPr/>
+                    <a:lstStyle/>
+                    <a:p>
+                      <a:pPr algn="r" fontAlgn="b"/>
+                      <a:r>
+                        <a:rPr lang="en-US" sz="1100" u="none" strike="noStrike">
+                          <a:effectLst/>
+                        </a:rPr>
+                        <a:t>0.228125312</a:t>
+                      </a:r>
+                      <a:endParaRPr lang="en-US" sz="1100" b="0" i="0" u="none" strike="noStrike">
+                        <a:solidFill>
+                          <a:srgbClr val="000000"/>
+                        </a:solidFill>
+                        <a:effectLst/>
+                        <a:latin typeface="Calibri" panose="020F0502020204030204" pitchFamily="34" charset="0"/>
+                      </a:endParaRPr>
+                    </a:p>
+                  </a:txBody>
+                  <a:tcPr marL="9525" marR="9525" marT="9525" marB="0" anchor="b"/>
+                </a:tc>
+                <a:tc>
+                  <a:txBody>
+                    <a:bodyPr/>
+                    <a:lstStyle/>
+                    <a:p>
+                      <a:pPr algn="r" fontAlgn="b"/>
+                      <a:r>
+                        <a:rPr lang="en-US" sz="1100" u="none" strike="noStrike" kern="1200" dirty="0">
+                          <a:solidFill>
+                            <a:srgbClr val="00B050"/>
+                          </a:solidFill>
+                          <a:effectLst/>
+                          <a:latin typeface="+mn-lt"/>
+                          <a:ea typeface="+mn-ea"/>
+                          <a:cs typeface="+mn-cs"/>
+                        </a:rPr>
+                        <a:t>0.146213417</a:t>
+                      </a:r>
+                    </a:p>
+                  </a:txBody>
+                  <a:tcPr marL="9525" marR="9525" marT="9525" marB="0" anchor="b"/>
+                </a:tc>
+                <a:extLst>
+                  <a:ext uri="{0D108BD9-81ED-4DB2-BD59-A6C34878D82A}">
+                    <a16:rowId xmlns:a16="http://schemas.microsoft.com/office/drawing/2014/main" val="3715823756"/>
+                  </a:ext>
+                </a:extLst>
+              </a:tr>
+              <a:tr h="190500">
+                <a:tc>
+                  <a:txBody>
+                    <a:bodyPr/>
+                    <a:lstStyle/>
+                    <a:p>
+                      <a:pPr algn="r" fontAlgn="ctr"/>
+                      <a:r>
+                        <a:rPr lang="en-US" sz="1100" u="none" strike="noStrike">
+                          <a:effectLst/>
+                        </a:rPr>
+                        <a:t>10</a:t>
+                      </a:r>
+                      <a:endParaRPr lang="en-US" sz="1100" b="0" i="0" u="none" strike="noStrike">
+                        <a:solidFill>
+                          <a:srgbClr val="1A202C"/>
+                        </a:solidFill>
+                        <a:effectLst/>
+                        <a:latin typeface="Var(--jp-code-font-family)"/>
+                      </a:endParaRPr>
+                    </a:p>
+                  </a:txBody>
+                  <a:tcPr marL="9525" marR="9525" marT="9525" marB="0" anchor="ctr"/>
+                </a:tc>
+                <a:tc>
+                  <a:txBody>
+                    <a:bodyPr/>
+                    <a:lstStyle/>
+                    <a:p>
+                      <a:pPr algn="r" fontAlgn="b"/>
+                      <a:r>
+                        <a:rPr lang="en-US" sz="1100" u="none" strike="noStrike">
+                          <a:effectLst/>
+                        </a:rPr>
+                        <a:t>0.170283</a:t>
+                      </a:r>
+                      <a:endParaRPr lang="en-US" sz="1100" b="0" i="0" u="none" strike="noStrike">
+                        <a:solidFill>
+                          <a:srgbClr val="000000"/>
+                        </a:solidFill>
+                        <a:effectLst/>
+                        <a:latin typeface="Calibri" panose="020F0502020204030204" pitchFamily="34" charset="0"/>
+                      </a:endParaRPr>
+                    </a:p>
+                  </a:txBody>
+                  <a:tcPr marL="9525" marR="9525" marT="9525" marB="0" anchor="b"/>
+                </a:tc>
+                <a:tc>
+                  <a:txBody>
+                    <a:bodyPr/>
+                    <a:lstStyle/>
+                    <a:p>
+                      <a:pPr algn="r" fontAlgn="b"/>
+                      <a:r>
+                        <a:rPr lang="en-US" sz="1100" u="none" strike="noStrike" kern="1200" dirty="0">
+                          <a:solidFill>
+                            <a:srgbClr val="00B050"/>
+                          </a:solidFill>
+                          <a:effectLst/>
+                          <a:latin typeface="+mn-lt"/>
+                          <a:ea typeface="+mn-ea"/>
+                          <a:cs typeface="+mn-cs"/>
+                        </a:rPr>
+                        <a:t>0.067686765</a:t>
+                      </a:r>
+                    </a:p>
+                  </a:txBody>
+                  <a:tcPr marL="9525" marR="9525" marT="9525" marB="0" anchor="b"/>
+                </a:tc>
+                <a:extLst>
+                  <a:ext uri="{0D108BD9-81ED-4DB2-BD59-A6C34878D82A}">
+                    <a16:rowId xmlns:a16="http://schemas.microsoft.com/office/drawing/2014/main" val="3905189369"/>
+                  </a:ext>
+                </a:extLst>
+              </a:tr>
+              <a:tr h="190500">
+                <a:tc>
+                  <a:txBody>
+                    <a:bodyPr/>
+                    <a:lstStyle/>
+                    <a:p>
+                      <a:pPr algn="r" fontAlgn="ctr"/>
+                      <a:r>
+                        <a:rPr lang="en-US" sz="1100" u="none" strike="noStrike">
+                          <a:effectLst/>
+                        </a:rPr>
+                        <a:t>11</a:t>
+                      </a:r>
+                      <a:endParaRPr lang="en-US" sz="1100" b="0" i="0" u="none" strike="noStrike">
+                        <a:solidFill>
+                          <a:srgbClr val="1A202C"/>
+                        </a:solidFill>
+                        <a:effectLst/>
+                        <a:latin typeface="Var(--jp-code-font-family)"/>
+                      </a:endParaRPr>
+                    </a:p>
+                  </a:txBody>
+                  <a:tcPr marL="9525" marR="9525" marT="9525" marB="0" anchor="ctr"/>
+                </a:tc>
+                <a:tc>
+                  <a:txBody>
+                    <a:bodyPr/>
+                    <a:lstStyle/>
+                    <a:p>
+                      <a:pPr algn="r" fontAlgn="b"/>
+                      <a:r>
+                        <a:rPr lang="en-US" sz="1100" u="none" strike="noStrike">
+                          <a:effectLst/>
+                        </a:rPr>
+                        <a:t>0.475614768</a:t>
+                      </a:r>
+                      <a:endParaRPr lang="en-US" sz="1100" b="0" i="0" u="none" strike="noStrike">
+                        <a:solidFill>
+                          <a:srgbClr val="000000"/>
+                        </a:solidFill>
+                        <a:effectLst/>
+                        <a:latin typeface="Calibri" panose="020F0502020204030204" pitchFamily="34" charset="0"/>
+                      </a:endParaRPr>
+                    </a:p>
+                  </a:txBody>
+                  <a:tcPr marL="9525" marR="9525" marT="9525" marB="0" anchor="b"/>
+                </a:tc>
+                <a:tc>
+                  <a:txBody>
+                    <a:bodyPr/>
+                    <a:lstStyle/>
+                    <a:p>
+                      <a:pPr algn="r" fontAlgn="b"/>
+                      <a:r>
+                        <a:rPr lang="en-US" sz="1100" u="none" strike="noStrike" kern="1200" dirty="0">
+                          <a:solidFill>
+                            <a:srgbClr val="00B050"/>
+                          </a:solidFill>
+                          <a:effectLst/>
+                          <a:latin typeface="+mn-lt"/>
+                          <a:ea typeface="+mn-ea"/>
+                          <a:cs typeface="+mn-cs"/>
+                        </a:rPr>
+                        <a:t>0.468708643</a:t>
+                      </a:r>
+                    </a:p>
+                  </a:txBody>
+                  <a:tcPr marL="9525" marR="9525" marT="9525" marB="0" anchor="b"/>
+                </a:tc>
+                <a:extLst>
+                  <a:ext uri="{0D108BD9-81ED-4DB2-BD59-A6C34878D82A}">
+                    <a16:rowId xmlns:a16="http://schemas.microsoft.com/office/drawing/2014/main" val="74420877"/>
+                  </a:ext>
+                </a:extLst>
+              </a:tr>
+              <a:tr h="190500">
+                <a:tc>
+                  <a:txBody>
+                    <a:bodyPr/>
+                    <a:lstStyle/>
+                    <a:p>
+                      <a:pPr algn="r" fontAlgn="ctr"/>
+                      <a:r>
+                        <a:rPr lang="en-US" sz="1100" u="none" strike="noStrike">
+                          <a:effectLst/>
+                        </a:rPr>
+                        <a:t>12</a:t>
+                      </a:r>
+                      <a:endParaRPr lang="en-US" sz="1100" b="0" i="0" u="none" strike="noStrike">
+                        <a:solidFill>
+                          <a:srgbClr val="1A202C"/>
+                        </a:solidFill>
+                        <a:effectLst/>
+                        <a:latin typeface="Var(--jp-code-font-family)"/>
+                      </a:endParaRPr>
+                    </a:p>
+                  </a:txBody>
+                  <a:tcPr marL="9525" marR="9525" marT="9525" marB="0" anchor="ctr"/>
+                </a:tc>
+                <a:tc>
+                  <a:txBody>
+                    <a:bodyPr/>
+                    <a:lstStyle/>
+                    <a:p>
+                      <a:pPr algn="r" fontAlgn="b"/>
+                      <a:r>
+                        <a:rPr lang="en-US" sz="1100" u="none" strike="noStrike">
+                          <a:effectLst/>
+                        </a:rPr>
+                        <a:t>0.26538296</a:t>
+                      </a:r>
+                      <a:endParaRPr lang="en-US" sz="1100" b="0" i="0" u="none" strike="noStrike">
+                        <a:solidFill>
+                          <a:srgbClr val="000000"/>
+                        </a:solidFill>
+                        <a:effectLst/>
+                        <a:latin typeface="Calibri" panose="020F0502020204030204" pitchFamily="34" charset="0"/>
+                      </a:endParaRPr>
+                    </a:p>
+                  </a:txBody>
+                  <a:tcPr marL="9525" marR="9525" marT="9525" marB="0" anchor="b"/>
+                </a:tc>
+                <a:tc>
+                  <a:txBody>
+                    <a:bodyPr/>
+                    <a:lstStyle/>
+                    <a:p>
+                      <a:pPr algn="r" fontAlgn="b"/>
+                      <a:r>
+                        <a:rPr lang="en-US" sz="1100" u="none" strike="noStrike" kern="1200" dirty="0">
+                          <a:solidFill>
+                            <a:srgbClr val="00B050"/>
+                          </a:solidFill>
+                          <a:effectLst/>
+                          <a:latin typeface="+mn-lt"/>
+                          <a:ea typeface="+mn-ea"/>
+                          <a:cs typeface="+mn-cs"/>
+                        </a:rPr>
+                        <a:t>0.138304864</a:t>
+                      </a:r>
+                    </a:p>
+                  </a:txBody>
+                  <a:tcPr marL="9525" marR="9525" marT="9525" marB="0" anchor="b"/>
+                </a:tc>
+                <a:extLst>
+                  <a:ext uri="{0D108BD9-81ED-4DB2-BD59-A6C34878D82A}">
+                    <a16:rowId xmlns:a16="http://schemas.microsoft.com/office/drawing/2014/main" val="1638245052"/>
+                  </a:ext>
+                </a:extLst>
+              </a:tr>
+              <a:tr h="190500">
+                <a:tc>
+                  <a:txBody>
+                    <a:bodyPr/>
+                    <a:lstStyle/>
+                    <a:p>
+                      <a:pPr algn="r" fontAlgn="ctr"/>
+                      <a:r>
+                        <a:rPr lang="en-US" sz="1100" u="none" strike="noStrike">
+                          <a:effectLst/>
+                        </a:rPr>
+                        <a:t>13</a:t>
+                      </a:r>
+                      <a:endParaRPr lang="en-US" sz="1100" b="0" i="0" u="none" strike="noStrike">
+                        <a:solidFill>
+                          <a:srgbClr val="1A202C"/>
+                        </a:solidFill>
+                        <a:effectLst/>
+                        <a:latin typeface="Var(--jp-code-font-family)"/>
+                      </a:endParaRPr>
+                    </a:p>
+                  </a:txBody>
+                  <a:tcPr marL="9525" marR="9525" marT="9525" marB="0" anchor="ctr"/>
+                </a:tc>
+                <a:tc>
+                  <a:txBody>
+                    <a:bodyPr/>
+                    <a:lstStyle/>
+                    <a:p>
+                      <a:pPr algn="r" fontAlgn="b"/>
+                      <a:r>
+                        <a:rPr lang="en-US" sz="1100" u="none" strike="noStrike" kern="1200" dirty="0">
+                          <a:solidFill>
+                            <a:srgbClr val="00B050"/>
+                          </a:solidFill>
+                          <a:effectLst/>
+                          <a:latin typeface="+mn-lt"/>
+                          <a:ea typeface="+mn-ea"/>
+                          <a:cs typeface="+mn-cs"/>
+                        </a:rPr>
+                        <a:t>0.105929144</a:t>
+                      </a:r>
+                    </a:p>
+                  </a:txBody>
+                  <a:tcPr marL="9525" marR="9525" marT="9525" marB="0" anchor="b"/>
+                </a:tc>
+                <a:tc>
+                  <a:txBody>
+                    <a:bodyPr/>
+                    <a:lstStyle/>
+                    <a:p>
+                      <a:pPr algn="r" fontAlgn="b"/>
+                      <a:r>
+                        <a:rPr lang="en-US" sz="1100" u="none" strike="noStrike">
+                          <a:effectLst/>
+                        </a:rPr>
+                        <a:t>0.145593008</a:t>
+                      </a:r>
+                      <a:endParaRPr lang="en-US" sz="1100" b="0" i="0" u="none" strike="noStrike">
+                        <a:solidFill>
+                          <a:srgbClr val="000000"/>
+                        </a:solidFill>
+                        <a:effectLst/>
+                        <a:latin typeface="Calibri" panose="020F0502020204030204" pitchFamily="34" charset="0"/>
+                      </a:endParaRPr>
+                    </a:p>
+                  </a:txBody>
+                  <a:tcPr marL="9525" marR="9525" marT="9525" marB="0" anchor="b"/>
+                </a:tc>
+                <a:extLst>
+                  <a:ext uri="{0D108BD9-81ED-4DB2-BD59-A6C34878D82A}">
+                    <a16:rowId xmlns:a16="http://schemas.microsoft.com/office/drawing/2014/main" val="2523107371"/>
+                  </a:ext>
+                </a:extLst>
+              </a:tr>
+              <a:tr h="190500">
+                <a:tc>
+                  <a:txBody>
+                    <a:bodyPr/>
+                    <a:lstStyle/>
+                    <a:p>
+                      <a:pPr algn="r" fontAlgn="ctr"/>
+                      <a:r>
+                        <a:rPr lang="en-US" sz="1100" u="none" strike="noStrike">
+                          <a:effectLst/>
+                        </a:rPr>
+                        <a:t>14</a:t>
+                      </a:r>
+                      <a:endParaRPr lang="en-US" sz="1100" b="0" i="0" u="none" strike="noStrike">
+                        <a:solidFill>
+                          <a:srgbClr val="1A202C"/>
+                        </a:solidFill>
+                        <a:effectLst/>
+                        <a:latin typeface="Var(--jp-code-font-family)"/>
+                      </a:endParaRPr>
+                    </a:p>
+                  </a:txBody>
+                  <a:tcPr marL="9525" marR="9525" marT="9525" marB="0" anchor="ctr"/>
+                </a:tc>
+                <a:tc>
+                  <a:txBody>
+                    <a:bodyPr/>
+                    <a:lstStyle/>
+                    <a:p>
+                      <a:pPr algn="r" fontAlgn="b"/>
+                      <a:r>
+                        <a:rPr lang="en-US" sz="1100" u="none" strike="noStrike">
+                          <a:effectLst/>
+                        </a:rPr>
+                        <a:t>0.278867869</a:t>
+                      </a:r>
+                      <a:endParaRPr lang="en-US" sz="1100" b="0" i="0" u="none" strike="noStrike">
+                        <a:solidFill>
+                          <a:srgbClr val="000000"/>
+                        </a:solidFill>
+                        <a:effectLst/>
+                        <a:latin typeface="Calibri" panose="020F0502020204030204" pitchFamily="34" charset="0"/>
+                      </a:endParaRPr>
+                    </a:p>
+                  </a:txBody>
+                  <a:tcPr marL="9525" marR="9525" marT="9525" marB="0" anchor="b"/>
+                </a:tc>
+                <a:tc>
+                  <a:txBody>
+                    <a:bodyPr/>
+                    <a:lstStyle/>
+                    <a:p>
+                      <a:pPr algn="r" fontAlgn="b"/>
+                      <a:r>
+                        <a:rPr lang="en-US" sz="1100" u="none" strike="noStrike" kern="1200" dirty="0">
+                          <a:solidFill>
+                            <a:srgbClr val="00B050"/>
+                          </a:solidFill>
+                          <a:effectLst/>
+                          <a:latin typeface="+mn-lt"/>
+                          <a:ea typeface="+mn-ea"/>
+                          <a:cs typeface="+mn-cs"/>
+                        </a:rPr>
+                        <a:t>0.170572979</a:t>
+                      </a:r>
+                    </a:p>
+                  </a:txBody>
+                  <a:tcPr marL="9525" marR="9525" marT="9525" marB="0" anchor="b"/>
+                </a:tc>
+                <a:extLst>
+                  <a:ext uri="{0D108BD9-81ED-4DB2-BD59-A6C34878D82A}">
+                    <a16:rowId xmlns:a16="http://schemas.microsoft.com/office/drawing/2014/main" val="1541034897"/>
+                  </a:ext>
+                </a:extLst>
+              </a:tr>
+              <a:tr h="190500">
+                <a:tc>
+                  <a:txBody>
+                    <a:bodyPr/>
+                    <a:lstStyle/>
+                    <a:p>
+                      <a:pPr algn="r" fontAlgn="ctr"/>
+                      <a:r>
+                        <a:rPr lang="en-US" sz="1100" u="none" strike="noStrike">
+                          <a:effectLst/>
+                        </a:rPr>
+                        <a:t>15</a:t>
+                      </a:r>
+                      <a:endParaRPr lang="en-US" sz="1100" b="0" i="0" u="none" strike="noStrike">
+                        <a:solidFill>
+                          <a:srgbClr val="1A202C"/>
+                        </a:solidFill>
+                        <a:effectLst/>
+                        <a:latin typeface="Var(--jp-code-font-family)"/>
+                      </a:endParaRPr>
+                    </a:p>
+                  </a:txBody>
+                  <a:tcPr marL="9525" marR="9525" marT="9525" marB="0" anchor="ctr"/>
+                </a:tc>
+                <a:tc>
+                  <a:txBody>
+                    <a:bodyPr/>
+                    <a:lstStyle/>
+                    <a:p>
+                      <a:pPr algn="r" fontAlgn="b"/>
+                      <a:r>
+                        <a:rPr lang="en-US" sz="1100" u="none" strike="noStrike" kern="1200" dirty="0">
+                          <a:solidFill>
+                            <a:srgbClr val="00B050"/>
+                          </a:solidFill>
+                          <a:effectLst/>
+                          <a:latin typeface="+mn-lt"/>
+                          <a:ea typeface="+mn-ea"/>
+                          <a:cs typeface="+mn-cs"/>
+                        </a:rPr>
+                        <a:t>0.053806265</a:t>
+                      </a:r>
+                    </a:p>
+                  </a:txBody>
+                  <a:tcPr marL="9525" marR="9525" marT="9525" marB="0" anchor="b"/>
+                </a:tc>
+                <a:tc>
+                  <a:txBody>
+                    <a:bodyPr/>
+                    <a:lstStyle/>
+                    <a:p>
+                      <a:pPr algn="r" fontAlgn="b"/>
+                      <a:r>
+                        <a:rPr lang="en-US" sz="1100" u="none" strike="noStrike">
+                          <a:effectLst/>
+                        </a:rPr>
+                        <a:t>0.059303773</a:t>
+                      </a:r>
+                      <a:endParaRPr lang="en-US" sz="1100" b="0" i="0" u="none" strike="noStrike">
+                        <a:solidFill>
+                          <a:srgbClr val="000000"/>
+                        </a:solidFill>
+                        <a:effectLst/>
+                        <a:latin typeface="Calibri" panose="020F0502020204030204" pitchFamily="34" charset="0"/>
+                      </a:endParaRPr>
+                    </a:p>
+                  </a:txBody>
+                  <a:tcPr marL="9525" marR="9525" marT="9525" marB="0" anchor="b"/>
+                </a:tc>
+                <a:extLst>
+                  <a:ext uri="{0D108BD9-81ED-4DB2-BD59-A6C34878D82A}">
+                    <a16:rowId xmlns:a16="http://schemas.microsoft.com/office/drawing/2014/main" val="422750813"/>
+                  </a:ext>
+                </a:extLst>
+              </a:tr>
+              <a:tr h="190500">
+                <a:tc>
+                  <a:txBody>
+                    <a:bodyPr/>
+                    <a:lstStyle/>
+                    <a:p>
+                      <a:pPr algn="r" fontAlgn="ctr"/>
+                      <a:r>
+                        <a:rPr lang="en-US" sz="1100" u="none" strike="noStrike">
+                          <a:effectLst/>
+                        </a:rPr>
+                        <a:t>16</a:t>
+                      </a:r>
+                      <a:endParaRPr lang="en-US" sz="1100" b="0" i="0" u="none" strike="noStrike">
+                        <a:solidFill>
+                          <a:srgbClr val="1A202C"/>
+                        </a:solidFill>
+                        <a:effectLst/>
+                        <a:latin typeface="Var(--jp-code-font-family)"/>
+                      </a:endParaRPr>
+                    </a:p>
+                  </a:txBody>
+                  <a:tcPr marL="9525" marR="9525" marT="9525" marB="0" anchor="ctr"/>
+                </a:tc>
+                <a:tc>
+                  <a:txBody>
+                    <a:bodyPr/>
+                    <a:lstStyle/>
+                    <a:p>
+                      <a:pPr algn="r" fontAlgn="b"/>
+                      <a:r>
+                        <a:rPr lang="en-US" sz="1100" u="none" strike="noStrike">
+                          <a:effectLst/>
+                        </a:rPr>
+                        <a:t>0.062170421</a:t>
+                      </a:r>
+                      <a:endParaRPr lang="en-US" sz="1100" b="0" i="0" u="none" strike="noStrike">
+                        <a:solidFill>
+                          <a:srgbClr val="000000"/>
+                        </a:solidFill>
+                        <a:effectLst/>
+                        <a:latin typeface="Calibri" panose="020F0502020204030204" pitchFamily="34" charset="0"/>
+                      </a:endParaRPr>
+                    </a:p>
+                  </a:txBody>
+                  <a:tcPr marL="9525" marR="9525" marT="9525" marB="0" anchor="b"/>
+                </a:tc>
+                <a:tc>
+                  <a:txBody>
+                    <a:bodyPr/>
+                    <a:lstStyle/>
+                    <a:p>
+                      <a:pPr algn="r" fontAlgn="b"/>
+                      <a:r>
+                        <a:rPr lang="en-US" sz="1100" u="none" strike="noStrike" kern="1200" dirty="0">
+                          <a:solidFill>
+                            <a:srgbClr val="00B050"/>
+                          </a:solidFill>
+                          <a:effectLst/>
+                          <a:latin typeface="+mn-lt"/>
+                          <a:ea typeface="+mn-ea"/>
+                          <a:cs typeface="+mn-cs"/>
+                        </a:rPr>
+                        <a:t>0.046713257</a:t>
+                      </a:r>
+                    </a:p>
+                  </a:txBody>
+                  <a:tcPr marL="9525" marR="9525" marT="9525" marB="0" anchor="b"/>
+                </a:tc>
+                <a:extLst>
+                  <a:ext uri="{0D108BD9-81ED-4DB2-BD59-A6C34878D82A}">
+                    <a16:rowId xmlns:a16="http://schemas.microsoft.com/office/drawing/2014/main" val="4220052437"/>
+                  </a:ext>
+                </a:extLst>
+              </a:tr>
+            </a:tbl>
+          </a:graphicData>
+        </a:graphic>
+      </p:graphicFrame>
+    </p:spTree>
+    <p:extLst>
+      <p:ext uri="{BB962C8B-B14F-4D97-AF65-F5344CB8AC3E}">
+        <p14:creationId xmlns:p14="http://schemas.microsoft.com/office/powerpoint/2010/main" val="535747419"/>
+      </p:ext>
+    </p:extLst>
+  </p:cSld>
+  <p:clrMapOvr>
+    <a:masterClrMapping/>
+  </p:clrMapOvr>
+</p:sld>
+</file>
+
+<file path=ppt/slides/slide15.xml><?xml version="1.0" encoding="utf-8"?>
+<p:sld xmlns:a="http://schemas.openxmlformats.org/drawingml/2006/main" xmlns:r="http://schemas.openxmlformats.org/officeDocument/2006/relationships" xmlns:p="http://schemas.openxmlformats.org/presentationml/2006/main">
+  <p:cSld>
+    <p:spTree>
+      <p:nvGrpSpPr>
+        <p:cNvPr id="1" name=""/>
+        <p:cNvGrpSpPr/>
+        <p:nvPr/>
+      </p:nvGrpSpPr>
+      <p:grpSpPr>
+        <a:xfrm>
+          <a:off x="0" y="0"/>
+          <a:ext cx="0" cy="0"/>
+          <a:chOff x="0" y="0"/>
+          <a:chExt cx="0" cy="0"/>
+        </a:xfrm>
+      </p:grpSpPr>
+      <p:sp>
+        <p:nvSpPr>
+          <p:cNvPr id="2" name="Title 1">
+            <a:extLst>
+              <a:ext uri="{FF2B5EF4-FFF2-40B4-BE49-F238E27FC236}">
+                <a16:creationId xmlns:a16="http://schemas.microsoft.com/office/drawing/2014/main" id="{B6CDED57-8409-4C2B-9E28-A42BE147D715}"/>
+              </a:ext>
+            </a:extLst>
+          </p:cNvPr>
+          <p:cNvSpPr>
+            <a:spLocks noGrp="1"/>
+          </p:cNvSpPr>
+          <p:nvPr>
+            <p:ph type="title"/>
+          </p:nvPr>
+        </p:nvSpPr>
+        <p:spPr/>
+        <p:txBody>
+          <a:bodyPr/>
+          <a:lstStyle/>
+          <a:p>
+            <a:r>
+              <a:rPr lang="en-US" dirty="0"/>
+              <a:t>Conclusion</a:t>
+            </a:r>
+          </a:p>
+        </p:txBody>
+      </p:sp>
+      <p:sp>
+        <p:nvSpPr>
+          <p:cNvPr id="3" name="Content Placeholder 2">
+            <a:extLst>
+              <a:ext uri="{FF2B5EF4-FFF2-40B4-BE49-F238E27FC236}">
+                <a16:creationId xmlns:a16="http://schemas.microsoft.com/office/drawing/2014/main" id="{3A0BAB58-EED3-436C-A12E-97058C53F26C}"/>
+              </a:ext>
+            </a:extLst>
+          </p:cNvPr>
+          <p:cNvSpPr>
+            <a:spLocks noGrp="1"/>
+          </p:cNvSpPr>
+          <p:nvPr>
+            <p:ph idx="1"/>
+          </p:nvPr>
+        </p:nvSpPr>
+        <p:spPr/>
+        <p:txBody>
+          <a:bodyPr>
+            <a:normAutofit fontScale="85000" lnSpcReduction="10000"/>
+          </a:bodyPr>
+          <a:lstStyle/>
+          <a:p>
+            <a:r>
+              <a:rPr lang="en-US" dirty="0"/>
+              <a:t>The cluster center approach is effective compared against with direct prophet model with regressor on temperature. </a:t>
+            </a:r>
+          </a:p>
+          <a:p>
+            <a:r>
+              <a:rPr lang="en-US" dirty="0"/>
+              <a:t>However, the accuracy on the center curve is still possible to be further tuned</a:t>
+            </a:r>
+          </a:p>
+          <a:p>
+            <a:r>
+              <a:rPr lang="en-US" dirty="0"/>
+              <a:t>The time spent with using the center is much longer than simply using the Prophet curve since it has higher prior scale, higher </a:t>
+            </a:r>
+            <a:r>
+              <a:rPr lang="en-US" dirty="0" err="1"/>
+              <a:t>fourier</a:t>
+            </a:r>
+            <a:r>
+              <a:rPr lang="en-US" dirty="0"/>
+              <a:t> order as well as additional seasonality. But when forecasting with multiple curves are required, using center becomes more effective since less number of models are built in general, especially when the curves all comes from the same cluster.</a:t>
+            </a:r>
+          </a:p>
+        </p:txBody>
+      </p:sp>
+    </p:spTree>
+    <p:extLst>
+      <p:ext uri="{BB962C8B-B14F-4D97-AF65-F5344CB8AC3E}">
+        <p14:creationId xmlns:p14="http://schemas.microsoft.com/office/powerpoint/2010/main" val="2434480999"/>
+      </p:ext>
+    </p:extLst>
+  </p:cSld>
+  <p:clrMapOvr>
+    <a:masterClrMapping/>
+  </p:clrMapOvr>
+</p:sld>
+</file>
+
+<file path=ppt/slides/slide16.xml><?xml version="1.0" encoding="utf-8"?>
+<p:sld xmlns:a="http://schemas.openxmlformats.org/drawingml/2006/main" xmlns:r="http://schemas.openxmlformats.org/officeDocument/2006/relationships" xmlns:p="http://schemas.openxmlformats.org/presentationml/2006/main">
+  <p:cSld>
+    <p:spTree>
+      <p:nvGrpSpPr>
+        <p:cNvPr id="1" name=""/>
+        <p:cNvGrpSpPr/>
+        <p:nvPr/>
+      </p:nvGrpSpPr>
+      <p:grpSpPr>
+        <a:xfrm>
+          <a:off x="0" y="0"/>
+          <a:ext cx="0" cy="0"/>
+          <a:chOff x="0" y="0"/>
+          <a:chExt cx="0" cy="0"/>
+        </a:xfrm>
+      </p:grpSpPr>
+      <p:sp>
+        <p:nvSpPr>
+          <p:cNvPr id="2" name="Title 1">
+            <a:extLst>
+              <a:ext uri="{FF2B5EF4-FFF2-40B4-BE49-F238E27FC236}">
+                <a16:creationId xmlns:a16="http://schemas.microsoft.com/office/drawing/2014/main" id="{B6CDED57-8409-4C2B-9E28-A42BE147D715}"/>
+              </a:ext>
+            </a:extLst>
+          </p:cNvPr>
+          <p:cNvSpPr>
+            <a:spLocks noGrp="1"/>
+          </p:cNvSpPr>
+          <p:nvPr>
+            <p:ph type="title"/>
+          </p:nvPr>
+        </p:nvSpPr>
+        <p:spPr/>
+        <p:txBody>
+          <a:bodyPr/>
+          <a:lstStyle/>
+          <a:p>
+            <a:r>
+              <a:rPr lang="en-US" dirty="0"/>
+              <a:t>Future work</a:t>
+            </a:r>
+          </a:p>
+        </p:txBody>
+      </p:sp>
+      <p:sp>
+        <p:nvSpPr>
+          <p:cNvPr id="3" name="Content Placeholder 2">
+            <a:extLst>
+              <a:ext uri="{FF2B5EF4-FFF2-40B4-BE49-F238E27FC236}">
+                <a16:creationId xmlns:a16="http://schemas.microsoft.com/office/drawing/2014/main" id="{3A0BAB58-EED3-436C-A12E-97058C53F26C}"/>
+              </a:ext>
+            </a:extLst>
+          </p:cNvPr>
+          <p:cNvSpPr>
+            <a:spLocks noGrp="1"/>
+          </p:cNvSpPr>
+          <p:nvPr>
+            <p:ph idx="1"/>
+          </p:nvPr>
+        </p:nvSpPr>
+        <p:spPr/>
+        <p:txBody>
+          <a:bodyPr>
+            <a:normAutofit fontScale="92500" lnSpcReduction="10000"/>
+          </a:bodyPr>
+          <a:lstStyle/>
+          <a:p>
+            <a:r>
+              <a:rPr lang="en-US" dirty="0"/>
+              <a:t>To improve the accuracy of the forecast, introducing regressor and properly predict the deviation for each curve may be required.</a:t>
+            </a:r>
+          </a:p>
+          <a:p>
+            <a:r>
+              <a:rPr lang="en-US" dirty="0"/>
+              <a:t>When introducing the cluster, the cluster center may be changed when new curve information are added, there may be a need to dynamically adjust the cluster center when requested</a:t>
+            </a:r>
+          </a:p>
+          <a:p>
+            <a:r>
+              <a:rPr lang="en-US" dirty="0"/>
+              <a:t>The project currently focused on commercial building data but not residential building data. Further study on residential data may be carried out.</a:t>
+            </a:r>
+          </a:p>
+          <a:p>
+            <a:pPr marL="0" indent="0">
+              <a:buNone/>
+            </a:pPr>
+            <a:endParaRPr lang="en-US" dirty="0"/>
+          </a:p>
+        </p:txBody>
+      </p:sp>
+    </p:spTree>
+    <p:extLst>
+      <p:ext uri="{BB962C8B-B14F-4D97-AF65-F5344CB8AC3E}">
+        <p14:creationId xmlns:p14="http://schemas.microsoft.com/office/powerpoint/2010/main" val="961537463"/>
+      </p:ext>
+    </p:extLst>
+  </p:cSld>
+  <p:clrMapOvr>
+    <a:masterClrMapping/>
+  </p:clrMapOvr>
+</p:sld>
+</file>
+
 <file path=ppt/slides/slide2.xml><?xml version="1.0" encoding="utf-8"?>
 <p:sld xmlns:a="http://schemas.openxmlformats.org/drawingml/2006/main" xmlns:r="http://schemas.openxmlformats.org/officeDocument/2006/relationships" xmlns:p="http://schemas.openxmlformats.org/presentationml/2006/main">
   <p:cSld>

</xml_diff>